<commit_message>
Corrected the exclusion command for the foreach loop (Option 3).
</commit_message>
<xml_diff>
--- a/HPC and git talk.pptx
+++ b/HPC and git talk.pptx
@@ -156,6 +156,10 @@
 </p:presentation>
 </file>
 
+<file path=ppt/revisionInfo.xml><?xml version="1.0" encoding="utf-8"?>
+<p1510:revInfo xmlns:a="http://schemas.openxmlformats.org/drawingml/2006/main" xmlns:r="http://schemas.openxmlformats.org/officeDocument/2006/relationships" xmlns:p1510="http://schemas.microsoft.com/office/powerpoint/2015/10/main"/>
+</file>
+
 <file path=ppt/notesMasters/notesMaster1.xml><?xml version="1.0" encoding="utf-8"?>
 <p:notesMaster xmlns:a="http://schemas.openxmlformats.org/drawingml/2006/main" xmlns:r="http://schemas.openxmlformats.org/officeDocument/2006/relationships" xmlns:p="http://schemas.openxmlformats.org/presentationml/2006/main">
   <p:cSld>
@@ -238,7 +242,7 @@
           <a:p>
             <a:fld id="{959E59C8-47F0-4148-92A0-E903AA0AEFBD}" type="datetimeFigureOut">
               <a:rPr lang="en-US" smtClean="0"/>
-              <a:t>7/24/2017</a:t>
+              <a:t>7/27/2017</a:t>
             </a:fld>
             <a:endParaRPr lang="en-US"/>
           </a:p>
@@ -996,7 +1000,7 @@
           <a:p>
             <a:fld id="{FD37BD70-C169-EE4F-AE0D-7C00031A0453}" type="datetime1">
               <a:rPr lang="en-AU" smtClean="0"/>
-              <a:t>24/07/2017</a:t>
+              <a:t>27/07/2017</a:t>
             </a:fld>
             <a:endParaRPr lang="en-AU"/>
           </a:p>
@@ -1196,7 +1200,7 @@
           <a:p>
             <a:fld id="{AA5E890D-1061-D549-967B-04E9B46F6844}" type="datetime1">
               <a:rPr lang="en-AU" smtClean="0"/>
-              <a:t>24/07/2017</a:t>
+              <a:t>27/07/2017</a:t>
             </a:fld>
             <a:endParaRPr lang="en-AU"/>
           </a:p>
@@ -1406,7 +1410,7 @@
           <a:p>
             <a:fld id="{531E7C23-B6B4-F848-9574-D714CDE76D99}" type="datetime1">
               <a:rPr lang="en-AU" smtClean="0"/>
-              <a:t>24/07/2017</a:t>
+              <a:t>27/07/2017</a:t>
             </a:fld>
             <a:endParaRPr lang="en-AU"/>
           </a:p>
@@ -1606,7 +1610,7 @@
           <a:p>
             <a:fld id="{5D301D3D-5DD0-0F4F-B060-E6738F614076}" type="datetime1">
               <a:rPr lang="en-AU" smtClean="0"/>
-              <a:t>24/07/2017</a:t>
+              <a:t>27/07/2017</a:t>
             </a:fld>
             <a:endParaRPr lang="en-AU"/>
           </a:p>
@@ -1882,7 +1886,7 @@
           <a:p>
             <a:fld id="{E81D2BDB-45F5-134D-9850-4BAEE7B174DC}" type="datetime1">
               <a:rPr lang="en-AU" smtClean="0"/>
-              <a:t>24/07/2017</a:t>
+              <a:t>27/07/2017</a:t>
             </a:fld>
             <a:endParaRPr lang="en-AU"/>
           </a:p>
@@ -2150,7 +2154,7 @@
           <a:p>
             <a:fld id="{B3E296D7-817C-DA4D-8B4E-40754920AF10}" type="datetime1">
               <a:rPr lang="en-AU" smtClean="0"/>
-              <a:t>24/07/2017</a:t>
+              <a:t>27/07/2017</a:t>
             </a:fld>
             <a:endParaRPr lang="en-AU"/>
           </a:p>
@@ -2565,7 +2569,7 @@
           <a:p>
             <a:fld id="{2D2BF31A-20C5-B545-AA33-6B394EC01457}" type="datetime1">
               <a:rPr lang="en-AU" smtClean="0"/>
-              <a:t>24/07/2017</a:t>
+              <a:t>27/07/2017</a:t>
             </a:fld>
             <a:endParaRPr lang="en-AU"/>
           </a:p>
@@ -2707,7 +2711,7 @@
           <a:p>
             <a:fld id="{AD65C01F-5870-D24F-BA8A-F4213FEE327C}" type="datetime1">
               <a:rPr lang="en-AU" smtClean="0"/>
-              <a:t>24/07/2017</a:t>
+              <a:t>27/07/2017</a:t>
             </a:fld>
             <a:endParaRPr lang="en-AU"/>
           </a:p>
@@ -2820,7 +2824,7 @@
           <a:p>
             <a:fld id="{B4B86442-F9E4-3A45-BC77-41EBC9D70B75}" type="datetime1">
               <a:rPr lang="en-AU" smtClean="0"/>
-              <a:t>24/07/2017</a:t>
+              <a:t>27/07/2017</a:t>
             </a:fld>
             <a:endParaRPr lang="en-AU"/>
           </a:p>
@@ -3133,7 +3137,7 @@
           <a:p>
             <a:fld id="{01CBC31E-32FA-B44E-9147-BDF257D7328A}" type="datetime1">
               <a:rPr lang="en-AU" smtClean="0"/>
-              <a:t>24/07/2017</a:t>
+              <a:t>27/07/2017</a:t>
             </a:fld>
             <a:endParaRPr lang="en-AU"/>
           </a:p>
@@ -3422,7 +3426,7 @@
           <a:p>
             <a:fld id="{85B6AABF-4892-604A-8A61-DD9A6F9C430E}" type="datetime1">
               <a:rPr lang="en-AU" smtClean="0"/>
-              <a:t>24/07/2017</a:t>
+              <a:t>27/07/2017</a:t>
             </a:fld>
             <a:endParaRPr lang="en-AU"/>
           </a:p>
@@ -3665,7 +3669,7 @@
           <a:p>
             <a:fld id="{4177F074-3B1D-FD42-999E-F241BC395434}" type="datetime1">
               <a:rPr lang="en-AU" smtClean="0"/>
-              <a:t>24/07/2017</a:t>
+              <a:t>27/07/2017</a:t>
             </a:fld>
             <a:endParaRPr lang="en-AU"/>
           </a:p>
@@ -13943,35 +13947,48 @@
             <p:ph idx="1"/>
           </p:nvPr>
         </p:nvSpPr>
-        <p:spPr/>
+        <p:spPr>
+          <a:xfrm>
+            <a:off x="838200" y="1825625"/>
+            <a:ext cx="10629900" cy="4351338"/>
+          </a:xfrm>
+        </p:spPr>
         <p:txBody>
           <a:bodyPr/>
           <a:lstStyle/>
           <a:p>
             <a:r>
-              <a:rPr lang="en-US"/>
+              <a:rPr lang="en-US" dirty="0"/>
               <a:t>Since the entire R environment is copied when using socket clusters, exclude variables not used in the function.</a:t>
             </a:r>
           </a:p>
           <a:p>
             <a:r>
-              <a:rPr lang="en-US"/>
+              <a:rPr lang="en-US" dirty="0"/>
               <a:t>In the </a:t>
             </a:r>
             <a:r>
-              <a:rPr lang="en-US" i="1" err="1"/>
+              <a:rPr lang="en-US" i="1" dirty="0" err="1"/>
               <a:t>foreach</a:t>
             </a:r>
             <a:r>
-              <a:rPr lang="en-US"/>
-              <a:t> context this is done using the .exclude = c(</a:t>
-            </a:r>
-            <a:r>
-              <a:rPr lang="en-US" err="1"/>
+              <a:rPr lang="en-US" dirty="0"/>
+              <a:t> context this is done using the .</a:t>
+            </a:r>
+            <a:r>
+              <a:rPr lang="en-US" dirty="0" err="1"/>
+              <a:t>noexport</a:t>
+            </a:r>
+            <a:r>
+              <a:rPr lang="en-US" dirty="0"/>
+              <a:t> = c(</a:t>
+            </a:r>
+            <a:r>
+              <a:rPr lang="en-US" dirty="0" err="1"/>
               <a:t>list_of_vars</a:t>
             </a:r>
             <a:r>
-              <a:rPr lang="en-US"/>
+              <a:rPr lang="en-US" dirty="0"/>
               <a:t>)</a:t>
             </a:r>
           </a:p>

</xml_diff>